<commit_message>
added structure pdf link
</commit_message>
<xml_diff>
--- a/database_struct/seatrack_plan.pptx
+++ b/database_struct/seatrack_plan.pptx
@@ -3941,6 +3941,13 @@
   <p:clrMapOvr>
     <a:masterClrMapping/>
   </p:clrMapOvr>
+  <p:timing>
+    <p:tnLst>
+      <p:par>
+        <p:cTn id="1" dur="indefinite" restart="never" nodeType="tmRoot"/>
+      </p:par>
+    </p:tnLst>
+  </p:timing>
 </p:sld>
 </file>
 
@@ -4135,6 +4142,15 @@
               <a:t> files</a:t>
             </a:r>
           </a:p>
+          <a:p>
+            <a:r>
+              <a:rPr lang="nb-NO" dirty="0" smtClean="0">
+                <a:hlinkClick r:id="rId3"/>
+              </a:rPr>
+              <a:t>https://github.com/NINAnor/seatrack-db/blob/master/database_struct/model/seatrack.pdf</a:t>
+            </a:r>
+            <a:endParaRPr lang="nb-NO" dirty="0" smtClean="0"/>
+          </a:p>
         </p:txBody>
       </p:sp>
       <p:graphicFrame>
@@ -4159,12 +4175,12 @@
           <a:graphicData uri="http://schemas.openxmlformats.org/presentationml/2006/ole">
             <mc:AlternateContent xmlns:mc="http://schemas.openxmlformats.org/markup-compatibility/2006">
               <mc:Choice xmlns:v="urn:schemas-microsoft-com:vml" Requires="v">
-                <p:oleObj spid="_x0000_s19468" name="Acrobat Document" r:id="rId3" imgW="20596664" imgH="18486012" progId="AcroExch.Document.DC">
+                <p:oleObj spid="_x0000_s19469" name="Acrobat Document" r:id="rId4" imgW="20596664" imgH="18486012" progId="AcroExch.Document.DC">
                   <p:embed/>
                 </p:oleObj>
               </mc:Choice>
               <mc:Fallback>
-                <p:oleObj name="Acrobat Document" r:id="rId3" imgW="20596664" imgH="18486012" progId="AcroExch.Document.DC">
+                <p:oleObj name="Acrobat Document" r:id="rId4" imgW="20596664" imgH="18486012" progId="AcroExch.Document.DC">
                   <p:embed/>
                   <p:pic>
                     <p:nvPicPr>
@@ -4173,7 +4189,7 @@
                       <p:nvPr/>
                     </p:nvPicPr>
                     <p:blipFill>
-                      <a:blip r:embed="rId4"/>
+                      <a:blip r:embed="rId5"/>
                       <a:stretch>
                         <a:fillRect/>
                       </a:stretch>
@@ -4204,6 +4220,13 @@
   <p:clrMapOvr>
     <a:masterClrMapping/>
   </p:clrMapOvr>
+  <p:timing>
+    <p:tnLst>
+      <p:par>
+        <p:cTn id="1" dur="indefinite" restart="never" nodeType="tmRoot"/>
+      </p:par>
+    </p:tnLst>
+  </p:timing>
 </p:sld>
 </file>
 
@@ -4476,6 +4499,13 @@
   <p:clrMapOvr>
     <a:masterClrMapping/>
   </p:clrMapOvr>
+  <p:timing>
+    <p:tnLst>
+      <p:par>
+        <p:cTn id="1" dur="indefinite" restart="never" nodeType="tmRoot"/>
+      </p:par>
+    </p:tnLst>
+  </p:timing>
 </p:sld>
 </file>
 
@@ -5264,7 +5294,7 @@
               <a:t>set</a:t>
             </a:r>
             <a:r>
-              <a:rPr lang="nb-NO" smtClean="0"/>
+              <a:rPr lang="nb-NO" dirty="0" smtClean="0"/>
               <a:t> up</a:t>
             </a:r>
             <a:endParaRPr lang="nb-NO" dirty="0" smtClean="0"/>

</xml_diff>